<commit_message>
Sections 1 & 2 finalised
</commit_message>
<xml_diff>
--- a/figure/dag_red.pptx
+++ b/figure/dag_red.pptx
@@ -243,7 +243,7 @@
           <a:p>
             <a:fld id="{256683E2-D4D9-EA4D-882B-830EF9E0B6E4}" type="datetimeFigureOut">
               <a:rPr lang="en-GB" smtClean="0"/>
-              <a:t>04/07/2022</a:t>
+              <a:t>17/07/2022</a:t>
             </a:fld>
             <a:endParaRPr lang="en-GB"/>
           </a:p>
@@ -413,7 +413,7 @@
           <a:p>
             <a:fld id="{256683E2-D4D9-EA4D-882B-830EF9E0B6E4}" type="datetimeFigureOut">
               <a:rPr lang="en-GB" smtClean="0"/>
-              <a:t>04/07/2022</a:t>
+              <a:t>17/07/2022</a:t>
             </a:fld>
             <a:endParaRPr lang="en-GB"/>
           </a:p>
@@ -593,7 +593,7 @@
           <a:p>
             <a:fld id="{256683E2-D4D9-EA4D-882B-830EF9E0B6E4}" type="datetimeFigureOut">
               <a:rPr lang="en-GB" smtClean="0"/>
-              <a:t>04/07/2022</a:t>
+              <a:t>17/07/2022</a:t>
             </a:fld>
             <a:endParaRPr lang="en-GB"/>
           </a:p>
@@ -763,7 +763,7 @@
           <a:p>
             <a:fld id="{256683E2-D4D9-EA4D-882B-830EF9E0B6E4}" type="datetimeFigureOut">
               <a:rPr lang="en-GB" smtClean="0"/>
-              <a:t>04/07/2022</a:t>
+              <a:t>17/07/2022</a:t>
             </a:fld>
             <a:endParaRPr lang="en-GB"/>
           </a:p>
@@ -1007,7 +1007,7 @@
           <a:p>
             <a:fld id="{256683E2-D4D9-EA4D-882B-830EF9E0B6E4}" type="datetimeFigureOut">
               <a:rPr lang="en-GB" smtClean="0"/>
-              <a:t>04/07/2022</a:t>
+              <a:t>17/07/2022</a:t>
             </a:fld>
             <a:endParaRPr lang="en-GB"/>
           </a:p>
@@ -1239,7 +1239,7 @@
           <a:p>
             <a:fld id="{256683E2-D4D9-EA4D-882B-830EF9E0B6E4}" type="datetimeFigureOut">
               <a:rPr lang="en-GB" smtClean="0"/>
-              <a:t>04/07/2022</a:t>
+              <a:t>17/07/2022</a:t>
             </a:fld>
             <a:endParaRPr lang="en-GB"/>
           </a:p>
@@ -1606,7 +1606,7 @@
           <a:p>
             <a:fld id="{256683E2-D4D9-EA4D-882B-830EF9E0B6E4}" type="datetimeFigureOut">
               <a:rPr lang="en-GB" smtClean="0"/>
-              <a:t>04/07/2022</a:t>
+              <a:t>17/07/2022</a:t>
             </a:fld>
             <a:endParaRPr lang="en-GB"/>
           </a:p>
@@ -1724,7 +1724,7 @@
           <a:p>
             <a:fld id="{256683E2-D4D9-EA4D-882B-830EF9E0B6E4}" type="datetimeFigureOut">
               <a:rPr lang="en-GB" smtClean="0"/>
-              <a:t>04/07/2022</a:t>
+              <a:t>17/07/2022</a:t>
             </a:fld>
             <a:endParaRPr lang="en-GB"/>
           </a:p>
@@ -1819,7 +1819,7 @@
           <a:p>
             <a:fld id="{256683E2-D4D9-EA4D-882B-830EF9E0B6E4}" type="datetimeFigureOut">
               <a:rPr lang="en-GB" smtClean="0"/>
-              <a:t>04/07/2022</a:t>
+              <a:t>17/07/2022</a:t>
             </a:fld>
             <a:endParaRPr lang="en-GB"/>
           </a:p>
@@ -2096,7 +2096,7 @@
           <a:p>
             <a:fld id="{256683E2-D4D9-EA4D-882B-830EF9E0B6E4}" type="datetimeFigureOut">
               <a:rPr lang="en-GB" smtClean="0"/>
-              <a:t>04/07/2022</a:t>
+              <a:t>17/07/2022</a:t>
             </a:fld>
             <a:endParaRPr lang="en-GB"/>
           </a:p>
@@ -2353,7 +2353,7 @@
           <a:p>
             <a:fld id="{256683E2-D4D9-EA4D-882B-830EF9E0B6E4}" type="datetimeFigureOut">
               <a:rPr lang="en-GB" smtClean="0"/>
-              <a:t>04/07/2022</a:t>
+              <a:t>17/07/2022</a:t>
             </a:fld>
             <a:endParaRPr lang="en-GB"/>
           </a:p>
@@ -2566,7 +2566,7 @@
           <a:p>
             <a:fld id="{256683E2-D4D9-EA4D-882B-830EF9E0B6E4}" type="datetimeFigureOut">
               <a:rPr lang="en-GB" smtClean="0"/>
-              <a:t>04/07/2022</a:t>
+              <a:t>17/07/2022</a:t>
             </a:fld>
             <a:endParaRPr lang="en-GB"/>
           </a:p>
@@ -2973,10 +2973,10 @@
       </p:grpSpPr>
       <p:pic>
         <p:nvPicPr>
-          <p:cNvPr id="3" name="Grafik 2">
+          <p:cNvPr id="4" name="Grafik 3">
             <a:extLst>
               <a:ext uri="{FF2B5EF4-FFF2-40B4-BE49-F238E27FC236}">
-                <a16:creationId xmlns:a16="http://schemas.microsoft.com/office/drawing/2014/main" id="{15CF6CA7-12CC-F6C1-24EF-30D9D3EBC2CB}"/>
+                <a16:creationId xmlns:a16="http://schemas.microsoft.com/office/drawing/2014/main" id="{519EE4D3-8210-D805-0FF4-05CBC27DEE85}"/>
               </a:ext>
             </a:extLst>
           </p:cNvPr>
@@ -2993,8 +2993,8 @@
         </p:blipFill>
         <p:spPr>
           <a:xfrm>
-            <a:off x="-300046" y="182552"/>
-            <a:ext cx="10680716" cy="6675448"/>
+            <a:off x="-299208" y="183600"/>
+            <a:ext cx="10679040" cy="6674400"/>
           </a:xfrm>
           <a:prstGeom prst="rect">
             <a:avLst/>
@@ -3017,8 +3017,8 @@
         </p:nvCxnSpPr>
         <p:spPr>
           <a:xfrm flipH="1">
-            <a:off x="5428974" y="1395896"/>
-            <a:ext cx="1532835" cy="1501913"/>
+            <a:off x="5431316" y="1395896"/>
+            <a:ext cx="1530493" cy="1512557"/>
           </a:xfrm>
           <a:prstGeom prst="straightConnector1">
             <a:avLst/>

</xml_diff>